<commit_message>
new snapshot datasets for acquisition 20230313
</commit_message>
<xml_diff>
--- a/documentation/RB_FPA_Analysis_Documentation.pptx
+++ b/documentation/RB_FPA_Analysis_Documentation.pptx
@@ -215,7 +215,7 @@
           <a:p>
             <a:fld id="{607E1ECD-5659-4330-B5BD-EDD3C66792C7}" type="datetimeFigureOut">
               <a:rPr lang="en-GB" smtClean="0"/>
-              <a:t>15/03/2023</a:t>
+              <a:t>16/03/2023</a:t>
             </a:fld>
             <a:endParaRPr lang="en-GB"/>
           </a:p>
@@ -392,7 +392,7 @@
           <a:p>
             <a:fld id="{AF757F5C-2357-4738-91F3-9E66A652F076}" type="datetimeFigureOut">
               <a:rPr lang="en-GB" smtClean="0"/>
-              <a:t>15/03/2023</a:t>
+              <a:t>16/03/2023</a:t>
             </a:fld>
             <a:endParaRPr lang="en-GB"/>
           </a:p>
@@ -780,7 +780,7 @@
           <a:p>
             <a:fld id="{4DABE7C4-64E4-4609-9048-4485F8260D9D}" type="datetime1">
               <a:rPr lang="en-US" smtClean="0"/>
-              <a:t>3/15/2023</a:t>
+              <a:t>3/16/2023</a:t>
             </a:fld>
             <a:endParaRPr lang="en-US"/>
           </a:p>
@@ -1043,7 +1043,7 @@
           <a:p>
             <a:fld id="{9E842E53-D700-4BA0-9151-2F119C6BF459}" type="datetime1">
               <a:rPr lang="en-US" smtClean="0"/>
-              <a:t>3/15/2023</a:t>
+              <a:t>3/16/2023</a:t>
             </a:fld>
             <a:endParaRPr lang="en-US"/>
           </a:p>
@@ -1343,7 +1343,7 @@
           <a:p>
             <a:fld id="{4490634D-AFF4-452E-A1D7-581AF4E84624}" type="datetime1">
               <a:rPr lang="en-US" smtClean="0"/>
-              <a:t>3/15/2023</a:t>
+              <a:t>3/16/2023</a:t>
             </a:fld>
             <a:endParaRPr lang="en-US"/>
           </a:p>
@@ -1916,7 +1916,7 @@
           <a:p>
             <a:fld id="{BE0BC315-3D8F-4D03-9ADF-2B0774C733B9}" type="datetime1">
               <a:rPr lang="en-US" smtClean="0"/>
-              <a:t>3/15/2023</a:t>
+              <a:t>3/16/2023</a:t>
             </a:fld>
             <a:endParaRPr lang="en-US" dirty="0"/>
           </a:p>
@@ -2348,7 +2348,7 @@
           <a:p>
             <a:fld id="{53ABC072-DB71-475E-90ED-7A38C7C8F3AE}" type="datetime1">
               <a:rPr lang="en-US" smtClean="0"/>
-              <a:t>3/15/2023</a:t>
+              <a:t>3/16/2023</a:t>
             </a:fld>
             <a:endParaRPr lang="en-US" dirty="0"/>
           </a:p>
@@ -2711,7 +2711,7 @@
           <a:p>
             <a:fld id="{48FBFEB3-0A50-4635-AF20-9D21A2ABF0D7}" type="datetime1">
               <a:rPr lang="en-US" smtClean="0"/>
-              <a:t>3/15/2023</a:t>
+              <a:t>3/16/2023</a:t>
             </a:fld>
             <a:endParaRPr lang="en-US"/>
           </a:p>
@@ -3095,7 +3095,7 @@
           <a:p>
             <a:fld id="{82F5FD83-1AD7-4F65-BC75-ED71305801FB}" type="datetime1">
               <a:rPr lang="en-US" smtClean="0"/>
-              <a:t>3/15/2023</a:t>
+              <a:t>3/16/2023</a:t>
             </a:fld>
             <a:endParaRPr lang="en-US"/>
           </a:p>
@@ -3348,7 +3348,7 @@
           <a:p>
             <a:fld id="{9DB1D176-F7FC-43C2-8A4A-65767DC66935}" type="datetime1">
               <a:rPr lang="en-US" smtClean="0"/>
-              <a:t>3/15/2023</a:t>
+              <a:t>3/16/2023</a:t>
             </a:fld>
             <a:endParaRPr lang="en-US" dirty="0"/>
           </a:p>
@@ -4029,36 +4029,6 @@
       </p:sp>
       <p:pic>
         <p:nvPicPr>
-          <p:cNvPr id="16" name="Picture 15">
-            <a:extLst>
-              <a:ext uri="{FF2B5EF4-FFF2-40B4-BE49-F238E27FC236}">
-                <a16:creationId xmlns:a16="http://schemas.microsoft.com/office/drawing/2014/main" id="{E08C103B-2507-3278-357C-6FD9E3E6759F}"/>
-              </a:ext>
-            </a:extLst>
-          </p:cNvPr>
-          <p:cNvPicPr>
-            <a:picLocks noChangeAspect="1"/>
-          </p:cNvPicPr>
-          <p:nvPr/>
-        </p:nvPicPr>
-        <p:blipFill>
-          <a:blip r:embed="rId2"/>
-          <a:stretch>
-            <a:fillRect/>
-          </a:stretch>
-        </p:blipFill>
-        <p:spPr>
-          <a:xfrm>
-            <a:off x="191059" y="1678947"/>
-            <a:ext cx="5104538" cy="3251105"/>
-          </a:xfrm>
-          <a:prstGeom prst="rect">
-            <a:avLst/>
-          </a:prstGeom>
-        </p:spPr>
-      </p:pic>
-      <p:pic>
-        <p:nvPicPr>
           <p:cNvPr id="18" name="Picture 17">
             <a:extLst>
               <a:ext uri="{FF2B5EF4-FFF2-40B4-BE49-F238E27FC236}">
@@ -4072,7 +4042,7 @@
           <p:nvPr/>
         </p:nvPicPr>
         <p:blipFill>
-          <a:blip r:embed="rId3"/>
+          <a:blip r:embed="rId2"/>
           <a:stretch>
             <a:fillRect/>
           </a:stretch>
@@ -4102,7 +4072,7 @@
           <p:nvPr/>
         </p:nvPicPr>
         <p:blipFill>
-          <a:blip r:embed="rId4"/>
+          <a:blip r:embed="rId3"/>
           <a:stretch>
             <a:fillRect/>
           </a:stretch>
@@ -4132,7 +4102,7 @@
           <p:nvPr/>
         </p:nvPicPr>
         <p:blipFill>
-          <a:blip r:embed="rId5"/>
+          <a:blip r:embed="rId4"/>
           <a:stretch>
             <a:fillRect/>
           </a:stretch>
@@ -4162,7 +4132,7 @@
           <p:nvPr/>
         </p:nvPicPr>
         <p:blipFill>
-          <a:blip r:embed="rId6"/>
+          <a:blip r:embed="rId5"/>
           <a:stretch>
             <a:fillRect/>
           </a:stretch>
@@ -4192,7 +4162,7 @@
           <p:nvPr/>
         </p:nvPicPr>
         <p:blipFill>
-          <a:blip r:embed="rId7"/>
+          <a:blip r:embed="rId6"/>
           <a:stretch>
             <a:fillRect/>
           </a:stretch>
@@ -4222,6 +4192,36 @@
           <p:nvPr/>
         </p:nvPicPr>
         <p:blipFill>
+          <a:blip r:embed="rId7"/>
+          <a:stretch>
+            <a:fillRect/>
+          </a:stretch>
+        </p:blipFill>
+        <p:spPr>
+          <a:xfrm>
+            <a:off x="9819866" y="3331192"/>
+            <a:ext cx="2160000" cy="1620000"/>
+          </a:xfrm>
+          <a:prstGeom prst="rect">
+            <a:avLst/>
+          </a:prstGeom>
+        </p:spPr>
+      </p:pic>
+      <p:pic>
+        <p:nvPicPr>
+          <p:cNvPr id="9" name="Picture 8">
+            <a:extLst>
+              <a:ext uri="{FF2B5EF4-FFF2-40B4-BE49-F238E27FC236}">
+                <a16:creationId xmlns:a16="http://schemas.microsoft.com/office/drawing/2014/main" id="{D563F5CE-4A45-52EA-1AAC-2DAA3A6CECDA}"/>
+              </a:ext>
+            </a:extLst>
+          </p:cNvPr>
+          <p:cNvPicPr>
+            <a:picLocks noChangeAspect="1"/>
+          </p:cNvPicPr>
+          <p:nvPr/>
+        </p:nvPicPr>
+        <p:blipFill>
           <a:blip r:embed="rId8"/>
           <a:stretch>
             <a:fillRect/>
@@ -4229,8 +4229,8 @@
         </p:blipFill>
         <p:spPr>
           <a:xfrm>
-            <a:off x="9819866" y="3331192"/>
-            <a:ext cx="2160000" cy="1620000"/>
+            <a:off x="191059" y="2082500"/>
+            <a:ext cx="4991333" cy="2524165"/>
           </a:xfrm>
           <a:prstGeom prst="rect">
             <a:avLst/>

</xml_diff>